<commit_message>
Update Boot Failures ppt
</commit_message>
<xml_diff>
--- a/BootFailures.pptx
+++ b/BootFailures.pptx
@@ -5,7 +5,7 @@
     <p:sldMasterId id="2147483660" r:id="rId1"/>
   </p:sldMasterIdLst>
   <p:notesMasterIdLst>
-    <p:notesMasterId r:id="rId11"/>
+    <p:notesMasterId r:id="rId10"/>
   </p:notesMasterIdLst>
   <p:sldIdLst>
     <p:sldId id="256" r:id="rId2"/>
@@ -13,10 +13,9 @@
     <p:sldId id="258" r:id="rId4"/>
     <p:sldId id="259" r:id="rId5"/>
     <p:sldId id="261" r:id="rId6"/>
-    <p:sldId id="262" r:id="rId7"/>
-    <p:sldId id="263" r:id="rId8"/>
-    <p:sldId id="264" r:id="rId9"/>
-    <p:sldId id="265" r:id="rId10"/>
+    <p:sldId id="263" r:id="rId7"/>
+    <p:sldId id="264" r:id="rId8"/>
+    <p:sldId id="265" r:id="rId9"/>
   </p:sldIdLst>
   <p:sldSz cx="12192000" cy="6858000"/>
   <p:notesSz cx="6858000" cy="9144000"/>
@@ -10853,9 +10852,10 @@
           <a:lstStyle/>
           <a:p>
             <a:r>
-              <a:t>Demonstration: Power &amp; POST</a:t>
-            </a:r>
-            <a:endParaRPr lang="en-US"/>
+              <a:rPr dirty="0"/>
+              <a:t>Demonstration</a:t>
+            </a:r>
+            <a:endParaRPr lang="en-US" dirty="0"/>
           </a:p>
         </p:txBody>
       </p:sp>
@@ -12321,7 +12321,7 @@
       </p:grpSpPr>
       <p:sp useBgFill="1">
         <p:nvSpPr>
-          <p:cNvPr id="11" name="Rectangle 10">
+          <p:cNvPr id="9" name="Rectangle 8">
             <a:extLst>
               <a:ext uri="{FF2B5EF4-FFF2-40B4-BE49-F238E27FC236}">
                 <a16:creationId xmlns:a16="http://schemas.microsoft.com/office/drawing/2014/main" id="{6E3254AE-C4CD-426D-A6E8-7FA13B0F889C}"/>
@@ -12381,11 +12381,11 @@
       </p:sp>
       <p:pic>
         <p:nvPicPr>
-          <p:cNvPr id="6" name="Online Media 3" title="10 Minute Timer">
+          <p:cNvPr id="4" name="Online Media 4" title="20 Minute Timer">
             <a:hlinkClick r:id="" action="ppaction://media"/>
             <a:extLst>
               <a:ext uri="{FF2B5EF4-FFF2-40B4-BE49-F238E27FC236}">
-                <a16:creationId xmlns:a16="http://schemas.microsoft.com/office/drawing/2014/main" id="{19279429-E13B-72B0-E64B-4F1CD4E73056}"/>
+                <a16:creationId xmlns:a16="http://schemas.microsoft.com/office/drawing/2014/main" id="{AE51641E-B144-3C08-1C4D-3680AE6A349E}"/>
               </a:ext>
             </a:extLst>
           </p:cNvPr>
@@ -12435,7 +12435,7 @@
       </p:pic>
       <p:pic>
         <p:nvPicPr>
-          <p:cNvPr id="13" name="Picture 12">
+          <p:cNvPr id="11" name="Picture 10">
             <a:extLst>
               <a:ext uri="{FF2B5EF4-FFF2-40B4-BE49-F238E27FC236}">
                 <a16:creationId xmlns:a16="http://schemas.microsoft.com/office/drawing/2014/main" id="{F5C53434-A0C7-4A81-8EB0-D460DAD9BB65}"/>
@@ -12501,7 +12501,8 @@
           <a:lstStyle/>
           <a:p>
             <a:r>
-              <a:t>Demonstration: Windows Recovery (WinRE)</a:t>
+              <a:rPr dirty="0"/>
+              <a:t>Practice</a:t>
             </a:r>
           </a:p>
         </p:txBody>
@@ -12519,269 +12520,9 @@
         <p:spPr>
           <a:xfrm>
             <a:off x="913774" y="2367092"/>
-            <a:ext cx="4860493" cy="3424107"/>
+            <a:ext cx="5182226" cy="3758135"/>
           </a:xfrm>
         </p:spPr>
-        <p:txBody>
-          <a:bodyPr>
-            <a:normAutofit/>
-          </a:bodyPr>
-          <a:lstStyle/>
-          <a:p>
-            <a:pPr>
-              <a:lnSpc>
-                <a:spcPct val="110000"/>
-              </a:lnSpc>
-              <a:defRPr sz="2000"/>
-            </a:pPr>
-            <a:r>
-              <a:rPr dirty="0"/>
-              <a:t>Startup Repair → automatic fix</a:t>
-            </a:r>
-            <a:endParaRPr lang="en-US" dirty="0"/>
-          </a:p>
-          <a:p>
-            <a:pPr>
-              <a:lnSpc>
-                <a:spcPct val="110000"/>
-              </a:lnSpc>
-              <a:defRPr sz="2000"/>
-            </a:pPr>
-            <a:r>
-              <a:rPr dirty="0"/>
-              <a:t>Safe Mode → minimal driver boot</a:t>
-            </a:r>
-            <a:endParaRPr lang="en-US" dirty="0"/>
-          </a:p>
-          <a:p>
-            <a:pPr>
-              <a:lnSpc>
-                <a:spcPct val="110000"/>
-              </a:lnSpc>
-              <a:defRPr sz="2000"/>
-            </a:pPr>
-            <a:r>
-              <a:rPr dirty="0"/>
-              <a:t>Command Prompt → </a:t>
-            </a:r>
-            <a:r>
-              <a:rPr dirty="0" err="1"/>
-              <a:t>bootrec</a:t>
-            </a:r>
-            <a:r>
-              <a:rPr dirty="0"/>
-              <a:t>, SFC, CHKDSK</a:t>
-            </a:r>
-            <a:endParaRPr lang="en-US" dirty="0"/>
-          </a:p>
-          <a:p>
-            <a:pPr>
-              <a:lnSpc>
-                <a:spcPct val="110000"/>
-              </a:lnSpc>
-              <a:defRPr sz="2000"/>
-            </a:pPr>
-            <a:r>
-              <a:rPr dirty="0"/>
-              <a:t>Video: https://www.youtube.com/watch?v=CK8pT64mFj0&amp;t=420s</a:t>
-            </a:r>
-            <a:endParaRPr lang="en-US" dirty="0"/>
-          </a:p>
-        </p:txBody>
-      </p:sp>
-    </p:spTree>
-  </p:cSld>
-  <p:clrMapOvr>
-    <a:masterClrMapping/>
-  </p:clrMapOvr>
-  <p:timing>
-    <p:tnLst>
-      <p:par>
-        <p:cTn id="1" dur="indefinite" restart="never" nodeType="tmRoot">
-          <p:childTnLst>
-            <p:seq concurrent="1" nextAc="seek">
-              <p:cTn id="2" dur="indefinite" nodeType="mainSeq">
-                <p:childTnLst>
-                  <p:par>
-                    <p:cTn id="3" fill="hold">
-                      <p:stCondLst>
-                        <p:cond delay="indefinite"/>
-                      </p:stCondLst>
-                      <p:childTnLst>
-                        <p:par>
-                          <p:cTn id="4" fill="hold">
-                            <p:stCondLst>
-                              <p:cond delay="0"/>
-                            </p:stCondLst>
-                            <p:childTnLst>
-                              <p:par>
-                                <p:cTn id="5" presetID="1" presetClass="mediacall" presetSubtype="0" fill="hold" nodeType="clickEffect">
-                                  <p:stCondLst>
-                                    <p:cond delay="0"/>
-                                  </p:stCondLst>
-                                  <p:childTnLst>
-                                    <p:cmd type="call" cmd="playFrom(0.0)">
-                                      <p:cBhvr>
-                                        <p:cTn id="6" dur="1" fill="hold"/>
-                                        <p:tgtEl>
-                                          <p:spTgt spid="6"/>
-                                        </p:tgtEl>
-                                      </p:cBhvr>
-                                    </p:cmd>
-                                  </p:childTnLst>
-                                </p:cTn>
-                              </p:par>
-                            </p:childTnLst>
-                          </p:cTn>
-                        </p:par>
-                      </p:childTnLst>
-                    </p:cTn>
-                  </p:par>
-                </p:childTnLst>
-              </p:cTn>
-              <p:prevCondLst>
-                <p:cond evt="onPrev" delay="0">
-                  <p:tgtEl>
-                    <p:sldTgt/>
-                  </p:tgtEl>
-                </p:cond>
-              </p:prevCondLst>
-              <p:nextCondLst>
-                <p:cond evt="onNext" delay="0">
-                  <p:tgtEl>
-                    <p:sldTgt/>
-                  </p:tgtEl>
-                </p:cond>
-              </p:nextCondLst>
-            </p:seq>
-            <p:seq concurrent="1" nextAc="seek">
-              <p:cTn id="7" restart="whenNotActive" fill="hold" evtFilter="cancelBubble" nodeType="interactiveSeq">
-                <p:stCondLst>
-                  <p:cond evt="onClick" delay="0">
-                    <p:tgtEl>
-                      <p:spTgt spid="6"/>
-                    </p:tgtEl>
-                  </p:cond>
-                </p:stCondLst>
-                <p:endSync evt="end" delay="0">
-                  <p:rtn val="all"/>
-                </p:endSync>
-                <p:childTnLst>
-                  <p:par>
-                    <p:cTn id="8" fill="hold">
-                      <p:stCondLst>
-                        <p:cond delay="0"/>
-                      </p:stCondLst>
-                      <p:childTnLst>
-                        <p:par>
-                          <p:cTn id="9" fill="hold">
-                            <p:stCondLst>
-                              <p:cond delay="0"/>
-                            </p:stCondLst>
-                            <p:childTnLst>
-                              <p:par>
-                                <p:cTn id="10" presetID="2" presetClass="mediacall" presetSubtype="0" fill="hold" nodeType="clickEffect">
-                                  <p:stCondLst>
-                                    <p:cond delay="0"/>
-                                  </p:stCondLst>
-                                  <p:childTnLst>
-                                    <p:cmd type="call" cmd="togglePause">
-                                      <p:cBhvr>
-                                        <p:cTn id="11" dur="1" fill="hold"/>
-                                        <p:tgtEl>
-                                          <p:spTgt spid="6"/>
-                                        </p:tgtEl>
-                                      </p:cBhvr>
-                                    </p:cmd>
-                                  </p:childTnLst>
-                                </p:cTn>
-                              </p:par>
-                            </p:childTnLst>
-                          </p:cTn>
-                        </p:par>
-                      </p:childTnLst>
-                    </p:cTn>
-                  </p:par>
-                </p:childTnLst>
-              </p:cTn>
-              <p:nextCondLst>
-                <p:cond evt="onClick" delay="0">
-                  <p:tgtEl>
-                    <p:spTgt spid="6"/>
-                  </p:tgtEl>
-                </p:cond>
-              </p:nextCondLst>
-            </p:seq>
-            <p:video>
-              <p:cMediaNode vol="80000">
-                <p:cTn id="12" fill="hold" display="0">
-                  <p:stCondLst>
-                    <p:cond delay="indefinite"/>
-                  </p:stCondLst>
-                </p:cTn>
-                <p:tgtEl>
-                  <p:spTgt spid="6"/>
-                </p:tgtEl>
-              </p:cMediaNode>
-            </p:video>
-          </p:childTnLst>
-        </p:cTn>
-      </p:par>
-    </p:tnLst>
-  </p:timing>
-</p:sld>
-</file>
-
-<file path=ppt/slides/slide7.xml><?xml version="1.0" encoding="utf-8"?>
-<p:sld xmlns:a="http://schemas.openxmlformats.org/drawingml/2006/main" xmlns:r="http://schemas.openxmlformats.org/officeDocument/2006/relationships" xmlns:p="http://schemas.openxmlformats.org/presentationml/2006/main">
-  <p:cSld>
-    <p:spTree>
-      <p:nvGrpSpPr>
-        <p:cNvPr id="1" name=""/>
-        <p:cNvGrpSpPr/>
-        <p:nvPr/>
-      </p:nvGrpSpPr>
-      <p:grpSpPr>
-        <a:xfrm>
-          <a:off x="0" y="0"/>
-          <a:ext cx="0" cy="0"/>
-          <a:chOff x="0" y="0"/>
-          <a:chExt cx="0" cy="0"/>
-        </a:xfrm>
-      </p:grpSpPr>
-      <p:sp>
-        <p:nvSpPr>
-          <p:cNvPr id="2" name="Title 1"/>
-          <p:cNvSpPr>
-            <a:spLocks noGrp="1"/>
-          </p:cNvSpPr>
-          <p:nvPr>
-            <p:ph type="title"/>
-          </p:nvPr>
-        </p:nvSpPr>
-        <p:spPr/>
-        <p:txBody>
-          <a:bodyPr/>
-          <a:lstStyle/>
-          <a:p>
-            <a:r>
-              <a:rPr dirty="0"/>
-              <a:t>Practice</a:t>
-            </a:r>
-          </a:p>
-        </p:txBody>
-      </p:sp>
-      <p:sp>
-        <p:nvSpPr>
-          <p:cNvPr id="3" name="Content Placeholder 2"/>
-          <p:cNvSpPr>
-            <a:spLocks noGrp="1"/>
-          </p:cNvSpPr>
-          <p:nvPr>
-            <p:ph idx="1"/>
-          </p:nvPr>
-        </p:nvSpPr>
-        <p:spPr/>
         <p:txBody>
           <a:bodyPr>
             <a:noAutofit/>
@@ -12793,8 +12534,12 @@
               <a:defRPr sz="2000"/>
             </a:pPr>
             <a:r>
-              <a:rPr sz="3200" dirty="0"/>
-              <a:t>Groups: Diagnose 3 symptom cards</a:t>
+              <a:rPr lang="en-US" sz="2400" b="1" i="1" u="sng" dirty="0"/>
+              <a:t>Groups of 3</a:t>
+            </a:r>
+            <a:r>
+              <a:rPr lang="en-US" sz="2400" dirty="0"/>
+              <a:t>: Diagnose 3 symptom</a:t>
             </a:r>
           </a:p>
           <a:p>
@@ -12804,7 +12549,7 @@
               <a:defRPr sz="2000"/>
             </a:pPr>
             <a:r>
-              <a:rPr sz="3200" dirty="0"/>
+              <a:rPr lang="en-US" sz="2400" dirty="0"/>
               <a:t>No POST</a:t>
             </a:r>
           </a:p>
@@ -12815,7 +12560,7 @@
               <a:defRPr sz="2000"/>
             </a:pPr>
             <a:r>
-              <a:rPr sz="3200" dirty="0"/>
+              <a:rPr lang="en-US" sz="2400" dirty="0"/>
               <a:t>Beep pattern</a:t>
             </a:r>
           </a:p>
@@ -12826,75 +12571,48 @@
               <a:defRPr sz="2000"/>
             </a:pPr>
             <a:r>
-              <a:rPr sz="3200" dirty="0"/>
+              <a:rPr lang="en-US" sz="2400" dirty="0"/>
               <a:t>Automatic Repair Loop</a:t>
             </a:r>
           </a:p>
           <a:p>
             <a:pPr>
+              <a:lnSpc>
+                <a:spcPct val="100000"/>
+              </a:lnSpc>
               <a:defRPr sz="2000"/>
             </a:pPr>
             <a:r>
-              <a:rPr sz="3200" dirty="0"/>
-              <a:t>Map First Safe Step → Tool → Next Decision</a:t>
-            </a:r>
-          </a:p>
-        </p:txBody>
-      </p:sp>
-      <p:pic>
-        <p:nvPicPr>
-          <p:cNvPr id="4" name="Online Media 4" title="20 Minute Timer">
-            <a:hlinkClick r:id="" action="ppaction://media"/>
-            <a:extLst>
-              <a:ext uri="{FF2B5EF4-FFF2-40B4-BE49-F238E27FC236}">
-                <a16:creationId xmlns:a16="http://schemas.microsoft.com/office/drawing/2014/main" id="{AE51641E-B144-3C08-1C4D-3680AE6A349E}"/>
-              </a:ext>
-            </a:extLst>
-          </p:cNvPr>
-          <p:cNvPicPr>
-            <a:picLocks noRot="1" noChangeAspect="1"/>
-          </p:cNvPicPr>
-          <p:nvPr>
-            <a:videoFile r:link="rId1"/>
-          </p:nvPr>
-        </p:nvPicPr>
-        <p:blipFill>
-          <a:blip r:embed="rId3"/>
-          <a:stretch>
-            <a:fillRect/>
-          </a:stretch>
-        </p:blipFill>
-        <p:spPr>
-          <a:xfrm>
-            <a:off x="7421781" y="4079146"/>
-            <a:ext cx="4770219" cy="2695173"/>
-          </a:xfrm>
-          <a:prstGeom prst="roundRect">
-            <a:avLst>
-              <a:gd name="adj" fmla="val 5301"/>
-            </a:avLst>
-          </a:prstGeom>
-          <a:ln w="82550" cap="sq">
-            <a:solidFill>
-              <a:srgbClr val="EAEAEA"/>
-            </a:solidFill>
-            <a:miter lim="800000"/>
-          </a:ln>
-          <a:effectLst/>
-          <a:scene3d>
-            <a:camera prst="orthographicFront"/>
-            <a:lightRig rig="threePt" dir="t">
-              <a:rot lat="0" lon="0" rev="2700000"/>
-            </a:lightRig>
-          </a:scene3d>
-          <a:sp3d contourW="6350">
-            <a:bevelT h="38100"/>
-            <a:contourClr>
-              <a:srgbClr val="C0C0C0"/>
-            </a:contourClr>
-          </a:sp3d>
-        </p:spPr>
-      </p:pic>
+              <a:rPr lang="en-US" sz="2400" dirty="0"/>
+              <a:t>First Safe Step → </a:t>
+            </a:r>
+          </a:p>
+          <a:p>
+            <a:pPr>
+              <a:lnSpc>
+                <a:spcPct val="100000"/>
+              </a:lnSpc>
+              <a:defRPr sz="2000"/>
+            </a:pPr>
+            <a:r>
+              <a:rPr lang="en-US" sz="2400" dirty="0"/>
+              <a:t>Tool → </a:t>
+            </a:r>
+          </a:p>
+          <a:p>
+            <a:pPr>
+              <a:lnSpc>
+                <a:spcPct val="100000"/>
+              </a:lnSpc>
+              <a:defRPr sz="2000"/>
+            </a:pPr>
+            <a:r>
+              <a:rPr lang="en-US" sz="2400" dirty="0"/>
+              <a:t>Next Decision →</a:t>
+            </a:r>
+          </a:p>
+        </p:txBody>
+      </p:sp>
     </p:spTree>
   </p:cSld>
   <p:clrMapOvr>
@@ -13038,7 +12756,7 @@
 </p:sld>
 </file>
 
-<file path=ppt/slides/slide8.xml><?xml version="1.0" encoding="utf-8"?>
+<file path=ppt/slides/slide7.xml><?xml version="1.0" encoding="utf-8"?>
 <p:sld xmlns:a="http://schemas.openxmlformats.org/drawingml/2006/main" xmlns:r="http://schemas.openxmlformats.org/officeDocument/2006/relationships" xmlns:p="http://schemas.openxmlformats.org/presentationml/2006/main">
   <p:cSld>
     <p:spTree>
@@ -13093,9 +12811,6 @@
           </a:bodyPr>
           <a:lstStyle/>
           <a:p>
-            <a:endParaRPr sz="3600" dirty="0"/>
-          </a:p>
-          <a:p>
             <a:pPr marL="0" indent="0">
               <a:buNone/>
               <a:defRPr sz="2000"/>
@@ -13104,14 +12819,15 @@
               <a:rPr sz="3600" dirty="0"/>
               <a:t>Stand-Up Debrief:</a:t>
             </a:r>
+            <a:endParaRPr lang="en-US" sz="3600" dirty="0"/>
           </a:p>
           <a:p>
             <a:pPr>
               <a:defRPr sz="2000"/>
             </a:pPr>
             <a:r>
-              <a:rPr sz="3600" dirty="0"/>
-              <a:t>One mistake to avoid</a:t>
+              <a:rPr lang="en-US" sz="3600" dirty="0"/>
+              <a:t>What is one mistake to avoid?</a:t>
             </a:r>
           </a:p>
           <a:p>
@@ -13119,9 +12835,15 @@
               <a:defRPr sz="2000"/>
             </a:pPr>
             <a:r>
-              <a:rPr sz="3600" dirty="0"/>
-              <a:t>One best practice to start with</a:t>
-            </a:r>
+              <a:rPr lang="en-US" sz="3600" dirty="0"/>
+              <a:t>What is One best practice to start with?</a:t>
+            </a:r>
+          </a:p>
+          <a:p>
+            <a:pPr>
+              <a:defRPr sz="2000"/>
+            </a:pPr>
+            <a:endParaRPr sz="3600" dirty="0"/>
           </a:p>
         </p:txBody>
       </p:sp>
@@ -13150,8 +12872,8 @@
         </p:blipFill>
         <p:spPr>
           <a:xfrm>
-            <a:off x="7421781" y="4079144"/>
-            <a:ext cx="4770219" cy="2695173"/>
+            <a:off x="8637373" y="4765953"/>
+            <a:ext cx="3554627" cy="2008364"/>
           </a:xfrm>
           <a:prstGeom prst="roundRect">
             <a:avLst>
@@ -13322,7 +13044,7 @@
 </p:sld>
 </file>
 
-<file path=ppt/slides/slide9.xml><?xml version="1.0" encoding="utf-8"?>
+<file path=ppt/slides/slide8.xml><?xml version="1.0" encoding="utf-8"?>
 <p:sld xmlns:a="http://schemas.openxmlformats.org/drawingml/2006/main" xmlns:r="http://schemas.openxmlformats.org/officeDocument/2006/relationships" xmlns:p="http://schemas.openxmlformats.org/presentationml/2006/main">
   <p:cSld>
     <p:spTree>
@@ -13355,8 +13077,10 @@
           <a:lstStyle/>
           <a:p>
             <a:r>
-              <a:t>Exit Ticket</a:t>
-            </a:r>
+              <a:rPr lang="en-US" dirty="0"/>
+              <a:t>Check Point 1 Quiz</a:t>
+            </a:r>
+            <a:endParaRPr dirty="0"/>
           </a:p>
         </p:txBody>
       </p:sp>
@@ -13372,25 +13096,19 @@
         </p:nvSpPr>
         <p:spPr/>
         <p:txBody>
-          <a:bodyPr/>
+          <a:bodyPr>
+            <a:normAutofit/>
+          </a:bodyPr>
           <a:lstStyle/>
           <a:p>
-            <a:endParaRPr dirty="0"/>
-          </a:p>
-          <a:p>
             <a:pPr marL="0" indent="0">
               <a:buNone/>
-              <a:defRPr sz="2000"/>
             </a:pPr>
             <a:r>
-              <a:rPr sz="3600" dirty="0"/>
-              <a:t>Quick 3 Questions:</a:t>
-            </a:r>
-            <a:r>
-              <a:rPr lang="en-US" sz="3600" dirty="0"/>
-              <a:t> Complete in Google Classroom</a:t>
-            </a:r>
-            <a:endParaRPr sz="3600" dirty="0"/>
+              <a:rPr lang="en-US" sz="4000" dirty="0"/>
+              <a:t>Complete Check Point 1 Quiz</a:t>
+            </a:r>
+            <a:endParaRPr sz="4000" dirty="0"/>
           </a:p>
         </p:txBody>
       </p:sp>

</xml_diff>